<commit_message>
New update 27 Oct 2014
</commit_message>
<xml_diff>
--- a/Portal/Portal_mobile-mockup.pptx
+++ b/Portal/Portal_mobile-mockup.pptx
@@ -289,7 +289,7 @@
           <a:p>
             <a:fld id="{0AF43D71-5132-4725-81BF-C354BDD78DE3}" type="datetimeFigureOut">
               <a:rPr lang="fi-FI" smtClean="0"/>
-              <a:t>20.10.2014</a:t>
+              <a:t>26/10/14</a:t>
             </a:fld>
             <a:endParaRPr lang="fi-FI"/>
           </a:p>
@@ -459,7 +459,7 @@
           <a:p>
             <a:fld id="{0AF43D71-5132-4725-81BF-C354BDD78DE3}" type="datetimeFigureOut">
               <a:rPr lang="fi-FI" smtClean="0"/>
-              <a:t>20.10.2014</a:t>
+              <a:t>26/10/14</a:t>
             </a:fld>
             <a:endParaRPr lang="fi-FI"/>
           </a:p>
@@ -639,7 +639,7 @@
           <a:p>
             <a:fld id="{0AF43D71-5132-4725-81BF-C354BDD78DE3}" type="datetimeFigureOut">
               <a:rPr lang="fi-FI" smtClean="0"/>
-              <a:t>20.10.2014</a:t>
+              <a:t>26/10/14</a:t>
             </a:fld>
             <a:endParaRPr lang="fi-FI"/>
           </a:p>
@@ -809,7 +809,7 @@
           <a:p>
             <a:fld id="{0AF43D71-5132-4725-81BF-C354BDD78DE3}" type="datetimeFigureOut">
               <a:rPr lang="fi-FI" smtClean="0"/>
-              <a:t>20.10.2014</a:t>
+              <a:t>26/10/14</a:t>
             </a:fld>
             <a:endParaRPr lang="fi-FI"/>
           </a:p>
@@ -1055,7 +1055,7 @@
           <a:p>
             <a:fld id="{0AF43D71-5132-4725-81BF-C354BDD78DE3}" type="datetimeFigureOut">
               <a:rPr lang="fi-FI" smtClean="0"/>
-              <a:t>20.10.2014</a:t>
+              <a:t>26/10/14</a:t>
             </a:fld>
             <a:endParaRPr lang="fi-FI"/>
           </a:p>
@@ -1343,7 +1343,7 @@
           <a:p>
             <a:fld id="{0AF43D71-5132-4725-81BF-C354BDD78DE3}" type="datetimeFigureOut">
               <a:rPr lang="fi-FI" smtClean="0"/>
-              <a:t>20.10.2014</a:t>
+              <a:t>26/10/14</a:t>
             </a:fld>
             <a:endParaRPr lang="fi-FI"/>
           </a:p>
@@ -1765,7 +1765,7 @@
           <a:p>
             <a:fld id="{0AF43D71-5132-4725-81BF-C354BDD78DE3}" type="datetimeFigureOut">
               <a:rPr lang="fi-FI" smtClean="0"/>
-              <a:t>20.10.2014</a:t>
+              <a:t>26/10/14</a:t>
             </a:fld>
             <a:endParaRPr lang="fi-FI"/>
           </a:p>
@@ -1883,7 +1883,7 @@
           <a:p>
             <a:fld id="{0AF43D71-5132-4725-81BF-C354BDD78DE3}" type="datetimeFigureOut">
               <a:rPr lang="fi-FI" smtClean="0"/>
-              <a:t>20.10.2014</a:t>
+              <a:t>26/10/14</a:t>
             </a:fld>
             <a:endParaRPr lang="fi-FI"/>
           </a:p>
@@ -1978,7 +1978,7 @@
           <a:p>
             <a:fld id="{0AF43D71-5132-4725-81BF-C354BDD78DE3}" type="datetimeFigureOut">
               <a:rPr lang="fi-FI" smtClean="0"/>
-              <a:t>20.10.2014</a:t>
+              <a:t>26/10/14</a:t>
             </a:fld>
             <a:endParaRPr lang="fi-FI"/>
           </a:p>
@@ -2255,7 +2255,7 @@
           <a:p>
             <a:fld id="{0AF43D71-5132-4725-81BF-C354BDD78DE3}" type="datetimeFigureOut">
               <a:rPr lang="fi-FI" smtClean="0"/>
-              <a:t>20.10.2014</a:t>
+              <a:t>26/10/14</a:t>
             </a:fld>
             <a:endParaRPr lang="fi-FI"/>
           </a:p>
@@ -2512,7 +2512,7 @@
           <a:p>
             <a:fld id="{0AF43D71-5132-4725-81BF-C354BDD78DE3}" type="datetimeFigureOut">
               <a:rPr lang="fi-FI" smtClean="0"/>
-              <a:t>20.10.2014</a:t>
+              <a:t>26/10/14</a:t>
             </a:fld>
             <a:endParaRPr lang="fi-FI"/>
           </a:p>
@@ -2725,7 +2725,7 @@
           <a:p>
             <a:fld id="{0AF43D71-5132-4725-81BF-C354BDD78DE3}" type="datetimeFigureOut">
               <a:rPr lang="fi-FI" smtClean="0"/>
-              <a:t>20.10.2014</a:t>
+              <a:t>26/10/14</a:t>
             </a:fld>
             <a:endParaRPr lang="fi-FI"/>
           </a:p>
@@ -3132,14 +3132,14 @@
             <a:noFill/>
           </a:ln>
           <a:extLst>
-            <a:ext uri="{909E8E84-426E-40DD-AFC4-6F175D3DCCD1}">
+            <a:ext uri="{909E8E84-426E-40dd-AFC4-6F175D3DCCD1}">
               <a14:hiddenFill xmlns:a14="http://schemas.microsoft.com/office/drawing/2010/main">
                 <a:solidFill>
                   <a:schemeClr val="accent1"/>
                 </a:solidFill>
               </a14:hiddenFill>
             </a:ext>
-            <a:ext uri="{91240B29-F687-4F45-9708-019B960494DF}">
+            <a:ext uri="{91240B29-F687-4f45-9708-019B960494DF}">
               <a14:hiddenLine xmlns:a14="http://schemas.microsoft.com/office/drawing/2010/main" w="9525">
                 <a:solidFill>
                   <a:schemeClr val="tx1"/>
@@ -3187,14 +3187,14 @@
           </a:ln>
           <a:effectLst/>
           <a:extLst>
-            <a:ext uri="{909E8E84-426E-40DD-AFC4-6F175D3DCCD1}">
+            <a:ext uri="{909E8E84-426E-40dd-AFC4-6F175D3DCCD1}">
               <a14:hiddenFill xmlns:a14="http://schemas.microsoft.com/office/drawing/2010/main">
                 <a:solidFill>
                   <a:schemeClr val="accent1"/>
                 </a:solidFill>
               </a14:hiddenFill>
             </a:ext>
-            <a:ext uri="{91240B29-F687-4F45-9708-019B960494DF}">
+            <a:ext uri="{91240B29-F687-4f45-9708-019B960494DF}">
               <a14:hiddenLine xmlns:a14="http://schemas.microsoft.com/office/drawing/2010/main" w="9525">
                 <a:solidFill>
                   <a:schemeClr val="tx1"/>
@@ -3204,7 +3204,7 @@
                 <a:tailEnd/>
               </a14:hiddenLine>
             </a:ext>
-            <a:ext uri="{AF507438-7753-43E0-B8FC-AC1667EBCBE1}">
+            <a:ext uri="{AF507438-7753-43e0-B8FC-AC1667EBCBE1}">
               <a14:hiddenEffects xmlns:a14="http://schemas.microsoft.com/office/drawing/2010/main">
                 <a:effectLst>
                   <a:outerShdw dist="35921" dir="2700000" algn="ctr" rotWithShape="0">
@@ -3247,7 +3247,7 @@
           </a:prstGeom>
           <a:noFill/>
           <a:extLst>
-            <a:ext uri="{909E8E84-426E-40DD-AFC4-6F175D3DCCD1}">
+            <a:ext uri="{909E8E84-426E-40dd-AFC4-6F175D3DCCD1}">
               <a14:hiddenFill xmlns:a14="http://schemas.microsoft.com/office/drawing/2010/main">
                 <a:solidFill>
                   <a:srgbClr val="FFFFFF"/>
@@ -3372,7 +3372,7 @@
           </a:prstGeom>
           <a:noFill/>
           <a:extLst>
-            <a:ext uri="{909E8E84-426E-40DD-AFC4-6F175D3DCCD1}">
+            <a:ext uri="{909E8E84-426E-40dd-AFC4-6F175D3DCCD1}">
               <a14:hiddenFill xmlns:a14="http://schemas.microsoft.com/office/drawing/2010/main">
                 <a:solidFill>
                   <a:srgbClr val="FFFFFF"/>
@@ -4091,7 +4091,7 @@
   <p:timing>
     <p:tnLst>
       <p:par>
-        <p:cTn id="1" dur="indefinite" restart="never" nodeType="tmRoot"/>
+        <p:cTn xmlns:p14="http://schemas.microsoft.com/office/powerpoint/2010/main" id="1" dur="indefinite" restart="never" nodeType="tmRoot"/>
       </p:par>
     </p:tnLst>
   </p:timing>
@@ -4150,14 +4150,14 @@
           </a:ln>
           <a:effectLst/>
           <a:extLst>
-            <a:ext uri="{909E8E84-426E-40DD-AFC4-6F175D3DCCD1}">
+            <a:ext uri="{909E8E84-426E-40dd-AFC4-6F175D3DCCD1}">
               <a14:hiddenFill xmlns:a14="http://schemas.microsoft.com/office/drawing/2010/main">
                 <a:solidFill>
                   <a:schemeClr val="accent1"/>
                 </a:solidFill>
               </a14:hiddenFill>
             </a:ext>
-            <a:ext uri="{91240B29-F687-4F45-9708-019B960494DF}">
+            <a:ext uri="{91240B29-F687-4f45-9708-019B960494DF}">
               <a14:hiddenLine xmlns:a14="http://schemas.microsoft.com/office/drawing/2010/main" w="9525">
                 <a:solidFill>
                   <a:schemeClr val="tx1"/>
@@ -4167,7 +4167,7 @@
                 <a:tailEnd/>
               </a14:hiddenLine>
             </a:ext>
-            <a:ext uri="{AF507438-7753-43E0-B8FC-AC1667EBCBE1}">
+            <a:ext uri="{AF507438-7753-43e0-B8FC-AC1667EBCBE1}">
               <a14:hiddenEffects xmlns:a14="http://schemas.microsoft.com/office/drawing/2010/main">
                 <a:effectLst>
                   <a:outerShdw dist="35921" dir="2700000" algn="ctr" rotWithShape="0">
@@ -4210,7 +4210,7 @@
           </a:prstGeom>
           <a:noFill/>
           <a:extLst>
-            <a:ext uri="{909E8E84-426E-40DD-AFC4-6F175D3DCCD1}">
+            <a:ext uri="{909E8E84-426E-40dd-AFC4-6F175D3DCCD1}">
               <a14:hiddenFill xmlns:a14="http://schemas.microsoft.com/office/drawing/2010/main">
                 <a:solidFill>
                   <a:srgbClr val="FFFFFF"/>
@@ -4335,7 +4335,7 @@
           </a:prstGeom>
           <a:noFill/>
           <a:extLst>
-            <a:ext uri="{909E8E84-426E-40DD-AFC4-6F175D3DCCD1}">
+            <a:ext uri="{909E8E84-426E-40dd-AFC4-6F175D3DCCD1}">
               <a14:hiddenFill xmlns:a14="http://schemas.microsoft.com/office/drawing/2010/main">
                 <a:solidFill>
                   <a:srgbClr val="FFFFFF"/>
@@ -5546,6 +5546,336 @@
           </a:p>
         </p:txBody>
       </p:sp>
+      <p:sp>
+        <p:nvSpPr>
+          <p:cNvPr id="7" name="TextBox 6"/>
+          <p:cNvSpPr txBox="1"/>
+          <p:nvPr/>
+        </p:nvSpPr>
+        <p:spPr>
+          <a:xfrm>
+            <a:off x="-1980728" y="3284984"/>
+            <a:ext cx="2880320" cy="1200329"/>
+          </a:xfrm>
+          <a:prstGeom prst="rect">
+            <a:avLst/>
+          </a:prstGeom>
+          <a:noFill/>
+        </p:spPr>
+        <p:txBody>
+          <a:bodyPr wrap="square" rtlCol="0">
+            <a:spAutoFit/>
+          </a:bodyPr>
+          <a:lstStyle/>
+          <a:p>
+            <a:r>
+              <a:rPr lang="en-US" dirty="0"/>
+              <a:t>Possibility for customer to apply for something (working name: “My applications”)</a:t>
+            </a:r>
+          </a:p>
+        </p:txBody>
+      </p:sp>
+      <p:sp>
+        <p:nvSpPr>
+          <p:cNvPr id="8" name="TextBox 7"/>
+          <p:cNvSpPr txBox="1"/>
+          <p:nvPr/>
+        </p:nvSpPr>
+        <p:spPr>
+          <a:xfrm>
+            <a:off x="-1980728" y="4581128"/>
+            <a:ext cx="2664296" cy="1477328"/>
+          </a:xfrm>
+          <a:prstGeom prst="rect">
+            <a:avLst/>
+          </a:prstGeom>
+          <a:noFill/>
+        </p:spPr>
+        <p:txBody>
+          <a:bodyPr wrap="square" rtlCol="0">
+            <a:spAutoFit/>
+          </a:bodyPr>
+          <a:lstStyle/>
+          <a:p>
+            <a:r>
+              <a:rPr lang="en-US" dirty="0"/>
+              <a:t>Possibility for customer to review existing information about himself (working name: “My data”)</a:t>
+            </a:r>
+          </a:p>
+        </p:txBody>
+      </p:sp>
+      <p:sp>
+        <p:nvSpPr>
+          <p:cNvPr id="9" name="TextBox 8"/>
+          <p:cNvSpPr txBox="1"/>
+          <p:nvPr/>
+        </p:nvSpPr>
+        <p:spPr>
+          <a:xfrm>
+            <a:off x="-2268760" y="6237312"/>
+            <a:ext cx="3168352" cy="1477328"/>
+          </a:xfrm>
+          <a:prstGeom prst="rect">
+            <a:avLst/>
+          </a:prstGeom>
+          <a:noFill/>
+        </p:spPr>
+        <p:txBody>
+          <a:bodyPr wrap="square" rtlCol="0">
+            <a:spAutoFit/>
+          </a:bodyPr>
+          <a:lstStyle/>
+          <a:p>
+            <a:r>
+              <a:rPr lang="en-US" dirty="0"/>
+              <a:t> View of the customers financial situation (“tax account”) &amp; </a:t>
+            </a:r>
+            <a:r>
+              <a:rPr lang="en-US" dirty="0" err="1" smtClean="0"/>
+              <a:t>possibilitcy</a:t>
+            </a:r>
+            <a:r>
+              <a:rPr lang="en-US" dirty="0" smtClean="0"/>
+              <a:t> </a:t>
+            </a:r>
+            <a:r>
+              <a:rPr lang="en-US" dirty="0"/>
+              <a:t>to make necessary payments (working name: “My account”)</a:t>
+            </a:r>
+          </a:p>
+        </p:txBody>
+      </p:sp>
+      <p:cxnSp>
+        <p:nvCxnSpPr>
+          <p:cNvPr id="11" name="Straight Arrow Connector 10"/>
+          <p:cNvCxnSpPr/>
+          <p:nvPr/>
+        </p:nvCxnSpPr>
+        <p:spPr>
+          <a:xfrm>
+            <a:off x="0" y="3789040"/>
+            <a:ext cx="1187624" cy="0"/>
+          </a:xfrm>
+          <a:prstGeom prst="straightConnector1">
+            <a:avLst/>
+          </a:prstGeom>
+          <a:ln>
+            <a:tailEnd type="arrow"/>
+          </a:ln>
+        </p:spPr>
+        <p:style>
+          <a:lnRef idx="2">
+            <a:schemeClr val="accent1"/>
+          </a:lnRef>
+          <a:fillRef idx="0">
+            <a:schemeClr val="accent1"/>
+          </a:fillRef>
+          <a:effectRef idx="1">
+            <a:schemeClr val="accent1"/>
+          </a:effectRef>
+          <a:fontRef idx="minor">
+            <a:schemeClr val="tx1"/>
+          </a:fontRef>
+        </p:style>
+      </p:cxnSp>
+      <p:cxnSp>
+        <p:nvCxnSpPr>
+          <p:cNvPr id="13" name="Straight Arrow Connector 12"/>
+          <p:cNvCxnSpPr/>
+          <p:nvPr/>
+        </p:nvCxnSpPr>
+        <p:spPr>
+          <a:xfrm flipV="1">
+            <a:off x="251520" y="4725144"/>
+            <a:ext cx="1080120" cy="360040"/>
+          </a:xfrm>
+          <a:prstGeom prst="straightConnector1">
+            <a:avLst/>
+          </a:prstGeom>
+          <a:ln>
+            <a:tailEnd type="arrow"/>
+          </a:ln>
+        </p:spPr>
+        <p:style>
+          <a:lnRef idx="2">
+            <a:schemeClr val="accent1"/>
+          </a:lnRef>
+          <a:fillRef idx="0">
+            <a:schemeClr val="accent1"/>
+          </a:fillRef>
+          <a:effectRef idx="1">
+            <a:schemeClr val="accent1"/>
+          </a:effectRef>
+          <a:fontRef idx="minor">
+            <a:schemeClr val="tx1"/>
+          </a:fontRef>
+        </p:style>
+      </p:cxnSp>
+      <p:cxnSp>
+        <p:nvCxnSpPr>
+          <p:cNvPr id="19" name="Straight Arrow Connector 18"/>
+          <p:cNvCxnSpPr/>
+          <p:nvPr/>
+        </p:nvCxnSpPr>
+        <p:spPr>
+          <a:xfrm flipV="1">
+            <a:off x="1691680" y="5157192"/>
+            <a:ext cx="0" cy="864096"/>
+          </a:xfrm>
+          <a:prstGeom prst="straightConnector1">
+            <a:avLst/>
+          </a:prstGeom>
+          <a:ln>
+            <a:tailEnd type="arrow"/>
+          </a:ln>
+        </p:spPr>
+        <p:style>
+          <a:lnRef idx="2">
+            <a:schemeClr val="accent1"/>
+          </a:lnRef>
+          <a:fillRef idx="0">
+            <a:schemeClr val="accent1"/>
+          </a:fillRef>
+          <a:effectRef idx="1">
+            <a:schemeClr val="accent1"/>
+          </a:effectRef>
+          <a:fontRef idx="minor">
+            <a:schemeClr val="tx1"/>
+          </a:fontRef>
+        </p:style>
+      </p:cxnSp>
+      <p:sp>
+        <p:nvSpPr>
+          <p:cNvPr id="20" name="TextBox 19"/>
+          <p:cNvSpPr txBox="1"/>
+          <p:nvPr/>
+        </p:nvSpPr>
+        <p:spPr>
+          <a:xfrm>
+            <a:off x="1259632" y="6165304"/>
+            <a:ext cx="2376264" cy="2031325"/>
+          </a:xfrm>
+          <a:prstGeom prst="rect">
+            <a:avLst/>
+          </a:prstGeom>
+          <a:noFill/>
+        </p:spPr>
+        <p:txBody>
+          <a:bodyPr wrap="square" rtlCol="0">
+            <a:spAutoFit/>
+          </a:bodyPr>
+          <a:lstStyle/>
+          <a:p>
+            <a:r>
+              <a:rPr lang="en-US" dirty="0"/>
+              <a:t>“Archive” function – possibility for customer to view “old cases” &gt; </a:t>
+            </a:r>
+            <a:r>
+              <a:rPr lang="en-US" dirty="0" err="1"/>
+              <a:t>primarly</a:t>
+            </a:r>
+            <a:r>
+              <a:rPr lang="en-US" dirty="0"/>
+              <a:t> documents, </a:t>
+            </a:r>
+            <a:r>
+              <a:rPr lang="en-US" dirty="0" err="1"/>
+              <a:t>ie</a:t>
+            </a:r>
+            <a:r>
+              <a:rPr lang="en-US" dirty="0"/>
+              <a:t>. letters or decisions or requests for information.</a:t>
+            </a:r>
+          </a:p>
+        </p:txBody>
+      </p:sp>
+      <p:sp>
+        <p:nvSpPr>
+          <p:cNvPr id="23" name="TextBox 22"/>
+          <p:cNvSpPr txBox="1"/>
+          <p:nvPr/>
+        </p:nvSpPr>
+        <p:spPr>
+          <a:xfrm>
+            <a:off x="4860032" y="6389948"/>
+            <a:ext cx="2664296" cy="936104"/>
+          </a:xfrm>
+          <a:prstGeom prst="rect">
+            <a:avLst/>
+          </a:prstGeom>
+          <a:noFill/>
+        </p:spPr>
+        <p:txBody>
+          <a:bodyPr wrap="square" rtlCol="0">
+            <a:spAutoFit/>
+          </a:bodyPr>
+          <a:lstStyle/>
+          <a:p>
+            <a:r>
+              <a:rPr lang="en-US" dirty="0"/>
+              <a:t>Proactive guidance (working name: “General information”)</a:t>
+            </a:r>
+          </a:p>
+        </p:txBody>
+      </p:sp>
+      <p:sp>
+        <p:nvSpPr>
+          <p:cNvPr id="24" name="TextBox 23"/>
+          <p:cNvSpPr txBox="1"/>
+          <p:nvPr/>
+        </p:nvSpPr>
+        <p:spPr>
+          <a:xfrm>
+            <a:off x="4788024" y="7533456"/>
+            <a:ext cx="2808312" cy="2308324"/>
+          </a:xfrm>
+          <a:prstGeom prst="rect">
+            <a:avLst/>
+          </a:prstGeom>
+          <a:noFill/>
+        </p:spPr>
+        <p:txBody>
+          <a:bodyPr wrap="square" rtlCol="0">
+            <a:spAutoFit/>
+          </a:bodyPr>
+          <a:lstStyle/>
+          <a:p>
+            <a:r>
+              <a:rPr lang="en-US" dirty="0"/>
+              <a:t> “powers of attorney” &gt; a possibility for the customer to mandate someone to act on his behalf (NB: this is something that has to be solved on a governmental level) (working name: “My mandates”)</a:t>
+            </a:r>
+          </a:p>
+        </p:txBody>
+      </p:sp>
+      <p:sp>
+        <p:nvSpPr>
+          <p:cNvPr id="25" name="TextBox 24"/>
+          <p:cNvSpPr txBox="1"/>
+          <p:nvPr/>
+        </p:nvSpPr>
+        <p:spPr>
+          <a:xfrm>
+            <a:off x="-2628800" y="1628800"/>
+            <a:ext cx="3456384" cy="1477328"/>
+          </a:xfrm>
+          <a:prstGeom prst="rect">
+            <a:avLst/>
+          </a:prstGeom>
+          <a:noFill/>
+        </p:spPr>
+        <p:txBody>
+          <a:bodyPr wrap="square" rtlCol="0">
+            <a:spAutoFit/>
+          </a:bodyPr>
+          <a:lstStyle/>
+          <a:p>
+            <a:r>
+              <a:rPr lang="en-US" dirty="0"/>
+              <a:t>Request to the customer (taxpayer) to check existing information &amp; provide additional information (working name: “Check and Add”)</a:t>
+            </a:r>
+          </a:p>
+        </p:txBody>
+      </p:sp>
     </p:spTree>
     <p:extLst>
       <p:ext uri="{BB962C8B-B14F-4D97-AF65-F5344CB8AC3E}">
@@ -5559,7 +5889,7 @@
   <p:timing>
     <p:tnLst>
       <p:par>
-        <p:cTn id="1" dur="indefinite" restart="never" nodeType="tmRoot"/>
+        <p:cTn xmlns:p14="http://schemas.microsoft.com/office/powerpoint/2010/main" id="1" dur="indefinite" restart="never" nodeType="tmRoot"/>
       </p:par>
     </p:tnLst>
   </p:timing>

</xml_diff>